<commit_message>
~ final tunning of responsive design and finalized presentation
</commit_message>
<xml_diff>
--- a/Hackathon-2024.pptx
+++ b/Hackathon-2024.pptx
@@ -3605,6 +3605,14 @@
               <a:rPr lang="en-US" dirty="0"/>
               <a:t>Claude</a:t>
             </a:r>
+            <a:endParaRPr lang="cs-CZ" dirty="0"/>
+          </a:p>
+          <a:p>
+            <a:r>
+              <a:rPr lang="en-US" dirty="0" err="1"/>
+              <a:t>elevenlabs</a:t>
+            </a:r>
+            <a:endParaRPr lang="en-US" dirty="0"/>
           </a:p>
           <a:p>
             <a:endParaRPr lang="cs-CZ" dirty="0"/>
@@ -3688,7 +3696,7 @@
         <p:spPr/>
         <p:txBody>
           <a:bodyPr>
-            <a:normAutofit lnSpcReduction="10000"/>
+            <a:normAutofit fontScale="92500" lnSpcReduction="10000"/>
           </a:bodyPr>
           <a:lstStyle/>
           <a:p>
@@ -3711,6 +3719,25 @@
             <a:endParaRPr lang="en-US" dirty="0"/>
           </a:p>
           <a:p>
+            <a:r>
+              <a:rPr lang="en-US" dirty="0"/>
+              <a:t>P</a:t>
+            </a:r>
+            <a:r>
+              <a:rPr lang="cs-CZ" dirty="0" err="1"/>
+              <a:t>řehrání</a:t>
+            </a:r>
+            <a:r>
+              <a:rPr lang="cs-CZ" dirty="0"/>
+              <a:t> obsahu pomocí text-to-</a:t>
+            </a:r>
+            <a:r>
+              <a:rPr lang="cs-CZ" dirty="0" err="1"/>
+              <a:t>speech</a:t>
+            </a:r>
+            <a:endParaRPr lang="en-US" dirty="0"/>
+          </a:p>
+          <a:p>
             <a:endParaRPr lang="en-US" dirty="0"/>
           </a:p>
           <a:p>
@@ -3728,20 +3755,8 @@
             <a:pPr lvl="1"/>
             <a:r>
               <a:rPr lang="cs-CZ" dirty="0"/>
-              <a:t>Kvíz</a:t>
-            </a:r>
-          </a:p>
-          <a:p>
-            <a:pPr lvl="1"/>
-            <a:r>
-              <a:rPr lang="cs-CZ" dirty="0"/>
-              <a:t>Text to </a:t>
-            </a:r>
-            <a:r>
-              <a:rPr lang="cs-CZ" dirty="0" err="1"/>
-              <a:t>speech</a:t>
-            </a:r>
-            <a:endParaRPr lang="cs-CZ" dirty="0"/>
+              <a:t>Kvíz…</a:t>
+            </a:r>
           </a:p>
           <a:p>
             <a:endParaRPr lang="cs-CZ" dirty="0"/>

</xml_diff>